<commit_message>
StanG: Convert script to use blog API
</commit_message>
<xml_diff>
--- a/whats_new.pptx
+++ b/whats_new.pptx
@@ -362,7 +362,7 @@
           <a:p>
             <a:fld id="{D2887149-AF03-6142-908A-3DD284EAF54B}" type="datetimeFigureOut">
               <a:rPr lang="en-US" smtClean="0"/>
-              <a:t>10/12/20</a:t>
+              <a:t>3/27/22</a:t>
             </a:fld>
             <a:endParaRPr lang="en-US"/>
           </a:p>
@@ -544,7 +544,7 @@
             <a:fld id="{0B25AC41-3BEC-9247-8322-91B80C013F2D}" type="datetimeFigureOut">
               <a:rPr lang="en-US" smtClean="0"/>
               <a:pPr/>
-              <a:t>10/12/20</a:t>
+              <a:t>3/27/22</a:t>
             </a:fld>
             <a:endParaRPr lang="en-US" dirty="0"/>
           </a:p>
@@ -6587,7 +6587,7 @@
           <a:p>
             <a:fld id="{6704E1F7-E333-4846-A6DF-8FA46494B7FD}" type="datetimeFigureOut">
               <a:rPr lang="en-US" smtClean="0"/>
-              <a:t>10/12/20</a:t>
+              <a:t>3/27/22</a:t>
             </a:fld>
             <a:endParaRPr lang="en-US"/>
           </a:p>
@@ -6755,7 +6755,7 @@
           <a:p>
             <a:fld id="{6704E1F7-E333-4846-A6DF-8FA46494B7FD}" type="datetimeFigureOut">
               <a:rPr lang="en-US" smtClean="0"/>
-              <a:t>10/12/20</a:t>
+              <a:t>3/27/22</a:t>
             </a:fld>
             <a:endParaRPr lang="en-US"/>
           </a:p>
@@ -7000,7 +7000,7 @@
           <a:p>
             <a:fld id="{6704E1F7-E333-4846-A6DF-8FA46494B7FD}" type="datetimeFigureOut">
               <a:rPr lang="en-US" smtClean="0"/>
-              <a:t>10/12/20</a:t>
+              <a:t>3/27/22</a:t>
             </a:fld>
             <a:endParaRPr lang="en-US"/>
           </a:p>
@@ -7366,7 +7366,7 @@
           <a:p>
             <a:fld id="{6704E1F7-E333-4846-A6DF-8FA46494B7FD}" type="datetimeFigureOut">
               <a:rPr lang="en-US" smtClean="0"/>
-              <a:t>10/12/20</a:t>
+              <a:t>3/27/22</a:t>
             </a:fld>
             <a:endParaRPr lang="en-US"/>
           </a:p>
@@ -7730,7 +7730,7 @@
           <a:p>
             <a:fld id="{6704E1F7-E333-4846-A6DF-8FA46494B7FD}" type="datetimeFigureOut">
               <a:rPr lang="en-US" smtClean="0"/>
-              <a:t>10/12/20</a:t>
+              <a:t>3/27/22</a:t>
             </a:fld>
             <a:endParaRPr lang="en-US"/>
           </a:p>
@@ -7847,7 +7847,7 @@
           <a:p>
             <a:fld id="{6704E1F7-E333-4846-A6DF-8FA46494B7FD}" type="datetimeFigureOut">
               <a:rPr lang="en-US" smtClean="0"/>
-              <a:t>10/12/20</a:t>
+              <a:t>3/27/22</a:t>
             </a:fld>
             <a:endParaRPr lang="en-US"/>
           </a:p>
@@ -7942,7 +7942,7 @@
           <a:p>
             <a:fld id="{6704E1F7-E333-4846-A6DF-8FA46494B7FD}" type="datetimeFigureOut">
               <a:rPr lang="en-US" smtClean="0"/>
-              <a:t>10/12/20</a:t>
+              <a:t>3/27/22</a:t>
             </a:fld>
             <a:endParaRPr lang="en-US"/>
           </a:p>
@@ -8217,7 +8217,7 @@
           <a:p>
             <a:fld id="{6704E1F7-E333-4846-A6DF-8FA46494B7FD}" type="datetimeFigureOut">
               <a:rPr lang="en-US" smtClean="0"/>
-              <a:t>10/12/20</a:t>
+              <a:t>3/27/22</a:t>
             </a:fld>
             <a:endParaRPr lang="en-US"/>
           </a:p>
@@ -8469,7 +8469,7 @@
           <a:p>
             <a:fld id="{6704E1F7-E333-4846-A6DF-8FA46494B7FD}" type="datetimeFigureOut">
               <a:rPr lang="en-US" smtClean="0"/>
-              <a:t>10/12/20</a:t>
+              <a:t>3/27/22</a:t>
             </a:fld>
             <a:endParaRPr lang="en-US"/>
           </a:p>
@@ -8637,7 +8637,7 @@
           <a:p>
             <a:fld id="{6704E1F7-E333-4846-A6DF-8FA46494B7FD}" type="datetimeFigureOut">
               <a:rPr lang="en-US" smtClean="0"/>
-              <a:t>10/12/20</a:t>
+              <a:t>3/27/22</a:t>
             </a:fld>
             <a:endParaRPr lang="en-US"/>
           </a:p>
@@ -8815,7 +8815,7 @@
           <a:p>
             <a:fld id="{6704E1F7-E333-4846-A6DF-8FA46494B7FD}" type="datetimeFigureOut">
               <a:rPr lang="en-US" smtClean="0"/>
-              <a:t>10/12/20</a:t>
+              <a:t>3/27/22</a:t>
             </a:fld>
             <a:endParaRPr lang="en-US"/>
           </a:p>
@@ -10816,7 +10816,7 @@
           <a:p>
             <a:fld id="{6704E1F7-E333-4846-A6DF-8FA46494B7FD}" type="datetimeFigureOut">
               <a:rPr lang="en-US" smtClean="0"/>
-              <a:t>10/12/20</a:t>
+              <a:t>3/27/22</a:t>
             </a:fld>
             <a:endParaRPr lang="en-US"/>
           </a:p>
@@ -11241,19 +11241,19 @@
           <a:p>
             <a:r>
               <a:rPr lang="en-US" dirty="0"/>
-              <a:t>Don Barber</a:t>
+              <a:t>Stan Guillory</a:t>
             </a:r>
           </a:p>
           <a:p>
             <a:r>
               <a:rPr lang="en-US" dirty="0"/>
-              <a:t>Principal Solutions Architect</a:t>
+              <a:t>Senior Solutions Architect</a:t>
             </a:r>
           </a:p>
           <a:p>
             <a:r>
               <a:rPr lang="en-US" dirty="0"/>
-              <a:t>10/20/2020</a:t>
+              <a:t>3/29/2022</a:t>
             </a:r>
           </a:p>
         </p:txBody>
@@ -11663,7 +11663,7 @@
           </a:prstGeom>
           <a:extLst>
             <a:ext uri="{C572A759-6A51-4108-AA02-DFA0A04FC94B}">
-              <ma14:wrappingTextBoxFlag xmlns:ma14="http://schemas.microsoft.com/office/mac/drawingml/2011/main" xmlns="" val="1"/>
+              <ma14:wrappingTextBoxFlag xmlns="" xmlns:ma14="http://schemas.microsoft.com/office/mac/drawingml/2011/main" val="1"/>
             </a:ext>
           </a:extLst>
         </p:spPr>
@@ -12014,7 +12014,7 @@
           </a:prstGeom>
           <a:extLst>
             <a:ext uri="{C572A759-6A51-4108-AA02-DFA0A04FC94B}">
-              <ma14:wrappingTextBoxFlag xmlns="" xmlns:ma14="http://schemas.microsoft.com/office/mac/drawingml/2011/main" val="1"/>
+              <ma14:wrappingTextBoxFlag xmlns:ma14="http://schemas.microsoft.com/office/mac/drawingml/2011/main" xmlns="" val="1"/>
             </a:ext>
           </a:extLst>
         </p:spPr>
@@ -16642,7 +16642,7 @@
           <a:p>
             <a:r>
               <a:rPr lang="en-US" dirty="0"/>
-              <a:t>Last PI was March 10</a:t>
+              <a:t>Last PI was January 10</a:t>
             </a:r>
           </a:p>
           <a:p>
@@ -16672,8 +16672,21 @@
               <a:t>Talk more? </a:t>
             </a:r>
             <a:r>
+              <a:rPr lang="en-US" dirty="0">
+                <a:hlinkClick r:id="rId2"/>
+              </a:rPr>
+              <a:t>stanaws@amazon.com</a:t>
+            </a:r>
+            <a:endParaRPr lang="en-US" dirty="0"/>
+          </a:p>
+          <a:p>
+            <a:r>
+              <a:rPr lang="en-US" dirty="0"/>
+              <a:t>Capital One Slack: @</a:t>
+            </a:r>
+            <a:r>
               <a:rPr lang="en-US" dirty="0" err="1"/>
-              <a:t>donbarb@amazon.com</a:t>
+              <a:t>stanaws</a:t>
             </a:r>
             <a:endParaRPr lang="en-US" dirty="0"/>
           </a:p>
@@ -17918,6 +17931,21 @@
 </file>
 
 <file path=customXml/item1.xml><?xml version="1.0" encoding="utf-8"?>
+<p:properties xmlns:p="http://schemas.microsoft.com/office/2006/metadata/properties" xmlns:xsi="http://www.w3.org/2001/XMLSchema-instance">
+  <documentManagement/>
+</p:properties>
+</file>
+
+<file path=customXml/item2.xml><?xml version="1.0" encoding="utf-8"?>
+<?mso-contentType ?>
+<FormTemplates xmlns="http://schemas.microsoft.com/sharepoint/v3/contenttype/forms">
+  <Display>DocumentLibraryForm</Display>
+  <Edit>DocumentLibraryForm</Edit>
+  <New>DocumentLibraryForm</New>
+</FormTemplates>
+</file>
+
+<file path=customXml/item3.xml><?xml version="1.0" encoding="utf-8"?>
 <ct:contentTypeSchema xmlns:ct="http://schemas.microsoft.com/office/2006/metadata/contentType" xmlns:ma="http://schemas.microsoft.com/office/2006/metadata/properties/metaAttributes" ct:_="" ma:_="" ma:contentTypeName="Document" ma:contentTypeID="0x010100D26A3D6C04DFD740953BA1B2B9E62D60" ma:contentTypeVersion="0" ma:contentTypeDescription="Create a new document." ma:contentTypeScope="" ma:versionID="26617cd14cd3af163c0e97ff614e520a">
   <xsd:schema xmlns:xsd="http://www.w3.org/2001/XMLSchema" xmlns:xs="http://www.w3.org/2001/XMLSchema" xmlns:p="http://schemas.microsoft.com/office/2006/metadata/properties" targetNamespace="http://schemas.microsoft.com/office/2006/metadata/properties" ma:root="true" ma:fieldsID="c64490b4aec6201516c3a874156f37b2">
     <xsd:element name="properties">
@@ -18031,22 +18059,30 @@
 </ct:contentTypeSchema>
 </file>
 
-<file path=customXml/item2.xml><?xml version="1.0" encoding="utf-8"?>
-<?mso-contentType ?>
-<FormTemplates xmlns="http://schemas.microsoft.com/sharepoint/v3/contenttype/forms">
-  <Display>DocumentLibraryForm</Display>
-  <Edit>DocumentLibraryForm</Edit>
-  <New>DocumentLibraryForm</New>
-</FormTemplates>
+<file path=customXml/itemProps1.xml><?xml version="1.0" encoding="utf-8"?>
+<ds:datastoreItem xmlns:ds="http://schemas.openxmlformats.org/officeDocument/2006/customXml" ds:itemID="{C597C89A-FD0C-431E-81F6-90225B937683}">
+  <ds:schemaRefs>
+    <ds:schemaRef ds:uri="http://schemas.microsoft.com/office/infopath/2007/PartnerControls"/>
+    <ds:schemaRef ds:uri="http://www.w3.org/XML/1998/namespace"/>
+    <ds:schemaRef ds:uri="http://schemas.microsoft.com/office/2006/documentManagement/types"/>
+    <ds:schemaRef ds:uri="http://purl.org/dc/dcmitype/"/>
+    <ds:schemaRef ds:uri="http://schemas.openxmlformats.org/package/2006/metadata/core-properties"/>
+    <ds:schemaRef ds:uri="http://purl.org/dc/terms/"/>
+    <ds:schemaRef ds:uri="http://schemas.microsoft.com/office/2006/metadata/properties"/>
+    <ds:schemaRef ds:uri="http://purl.org/dc/elements/1.1/"/>
+  </ds:schemaRefs>
+</ds:datastoreItem>
 </file>
 
-<file path=customXml/item3.xml><?xml version="1.0" encoding="utf-8"?>
-<p:properties xmlns:p="http://schemas.microsoft.com/office/2006/metadata/properties" xmlns:xsi="http://www.w3.org/2001/XMLSchema-instance">
-  <documentManagement/>
-</p:properties>
+<file path=customXml/itemProps2.xml><?xml version="1.0" encoding="utf-8"?>
+<ds:datastoreItem xmlns:ds="http://schemas.openxmlformats.org/officeDocument/2006/customXml" ds:itemID="{705B35A6-8B52-46A5-AE45-B98C6459DC10}">
+  <ds:schemaRefs>
+    <ds:schemaRef ds:uri="http://schemas.microsoft.com/sharepoint/v3/contenttype/forms"/>
+  </ds:schemaRefs>
+</ds:datastoreItem>
 </file>
 
-<file path=customXml/itemProps1.xml><?xml version="1.0" encoding="utf-8"?>
+<file path=customXml/itemProps3.xml><?xml version="1.0" encoding="utf-8"?>
 <ds:datastoreItem xmlns:ds="http://schemas.openxmlformats.org/officeDocument/2006/customXml" ds:itemID="{51A3258A-222C-4488-825E-7520D001FB75}">
   <ds:schemaRefs>
     <ds:schemaRef ds:uri="http://schemas.microsoft.com/office/2006/metadata/contentType"/>
@@ -18060,27 +18096,4 @@
     <ds:schemaRef ds:uri="http://schemas.microsoft.com/office/infopath/2007/PartnerControls"/>
   </ds:schemaRefs>
 </ds:datastoreItem>
-</file>
-
-<file path=customXml/itemProps2.xml><?xml version="1.0" encoding="utf-8"?>
-<ds:datastoreItem xmlns:ds="http://schemas.openxmlformats.org/officeDocument/2006/customXml" ds:itemID="{705B35A6-8B52-46A5-AE45-B98C6459DC10}">
-  <ds:schemaRefs>
-    <ds:schemaRef ds:uri="http://schemas.microsoft.com/sharepoint/v3/contenttype/forms"/>
-  </ds:schemaRefs>
-</ds:datastoreItem>
-</file>
-
-<file path=customXml/itemProps3.xml><?xml version="1.0" encoding="utf-8"?>
-<ds:datastoreItem xmlns:ds="http://schemas.openxmlformats.org/officeDocument/2006/customXml" ds:itemID="{C597C89A-FD0C-431E-81F6-90225B937683}">
-  <ds:schemaRefs>
-    <ds:schemaRef ds:uri="http://schemas.microsoft.com/office/infopath/2007/PartnerControls"/>
-    <ds:schemaRef ds:uri="http://www.w3.org/XML/1998/namespace"/>
-    <ds:schemaRef ds:uri="http://schemas.microsoft.com/office/2006/documentManagement/types"/>
-    <ds:schemaRef ds:uri="http://purl.org/dc/dcmitype/"/>
-    <ds:schemaRef ds:uri="http://schemas.openxmlformats.org/package/2006/metadata/core-properties"/>
-    <ds:schemaRef ds:uri="http://purl.org/dc/terms/"/>
-    <ds:schemaRef ds:uri="http://schemas.microsoft.com/office/2006/metadata/properties"/>
-    <ds:schemaRef ds:uri="http://purl.org/dc/elements/1.1/"/>
-  </ds:schemaRefs>
-</ds:datastoreItem>
 </file>
</xml_diff>